<commit_message>
tweak to reflect current code status.
</commit_message>
<xml_diff>
--- a/PRESENTATION/12-2665-Podcast.pptx
+++ b/PRESENTATION/12-2665-Podcast.pptx
@@ -14,19 +14,18 @@
     <p:sldId id="277" r:id="rId8"/>
     <p:sldId id="275" r:id="rId9"/>
     <p:sldId id="276" r:id="rId10"/>
-    <p:sldId id="263" r:id="rId11"/>
-    <p:sldId id="278" r:id="rId12"/>
-    <p:sldId id="279" r:id="rId13"/>
-    <p:sldId id="280" r:id="rId14"/>
-    <p:sldId id="273" r:id="rId15"/>
-    <p:sldId id="282" r:id="rId16"/>
-    <p:sldId id="265" r:id="rId17"/>
-    <p:sldId id="283" r:id="rId18"/>
-    <p:sldId id="285" r:id="rId19"/>
-    <p:sldId id="270" r:id="rId20"/>
-    <p:sldId id="286" r:id="rId21"/>
-    <p:sldId id="284" r:id="rId22"/>
-    <p:sldId id="287" r:id="rId23"/>
+    <p:sldId id="278" r:id="rId11"/>
+    <p:sldId id="279" r:id="rId12"/>
+    <p:sldId id="280" r:id="rId13"/>
+    <p:sldId id="273" r:id="rId14"/>
+    <p:sldId id="282" r:id="rId15"/>
+    <p:sldId id="265" r:id="rId16"/>
+    <p:sldId id="283" r:id="rId17"/>
+    <p:sldId id="285" r:id="rId18"/>
+    <p:sldId id="270" r:id="rId19"/>
+    <p:sldId id="286" r:id="rId20"/>
+    <p:sldId id="284" r:id="rId21"/>
+    <p:sldId id="287" r:id="rId22"/>
   </p:sldIdLst>
   <p:sldSz cx="9144000" cy="6858000" type="screen4x3"/>
   <p:notesSz cx="6858000" cy="9144000"/>
@@ -262,7 +261,7 @@
           <a:p>
             <a:fld id="{69992F9E-A296-4BDF-AB0D-9C195ECE07E1}" type="datetimeFigureOut">
               <a:rPr lang="en-US" smtClean="0"/>
-              <a:t>7/16/2012</a:t>
+              <a:t>7/22/2012</a:t>
             </a:fld>
             <a:endParaRPr lang="en-US"/>
           </a:p>
@@ -575,7 +574,7 @@
           <a:p>
             <a:fld id="{69992F9E-A296-4BDF-AB0D-9C195ECE07E1}" type="datetimeFigureOut">
               <a:rPr lang="en-US" smtClean="0"/>
-              <a:t>7/16/2012</a:t>
+              <a:t>7/22/2012</a:t>
             </a:fld>
             <a:endParaRPr lang="en-US"/>
           </a:p>
@@ -760,7 +759,7 @@
           <a:p>
             <a:fld id="{69992F9E-A296-4BDF-AB0D-9C195ECE07E1}" type="datetimeFigureOut">
               <a:rPr lang="en-US" smtClean="0"/>
-              <a:t>7/16/2012</a:t>
+              <a:t>7/22/2012</a:t>
             </a:fld>
             <a:endParaRPr lang="en-US"/>
           </a:p>
@@ -935,7 +934,7 @@
           <a:p>
             <a:fld id="{69992F9E-A296-4BDF-AB0D-9C195ECE07E1}" type="datetimeFigureOut">
               <a:rPr lang="en-US" smtClean="0"/>
-              <a:t>7/16/2012</a:t>
+              <a:t>7/22/2012</a:t>
             </a:fld>
             <a:endParaRPr lang="en-US"/>
           </a:p>
@@ -1203,7 +1202,7 @@
           <a:p>
             <a:fld id="{69992F9E-A296-4BDF-AB0D-9C195ECE07E1}" type="datetimeFigureOut">
               <a:rPr lang="en-US" smtClean="0"/>
-              <a:t>7/16/2012</a:t>
+              <a:t>7/22/2012</a:t>
             </a:fld>
             <a:endParaRPr lang="en-US"/>
           </a:p>
@@ -1671,7 +1670,7 @@
           <a:p>
             <a:fld id="{69992F9E-A296-4BDF-AB0D-9C195ECE07E1}" type="datetimeFigureOut">
               <a:rPr lang="en-US" smtClean="0"/>
-              <a:t>7/16/2012</a:t>
+              <a:t>7/22/2012</a:t>
             </a:fld>
             <a:endParaRPr lang="en-US"/>
           </a:p>
@@ -2160,7 +2159,7 @@
           <a:p>
             <a:fld id="{69992F9E-A296-4BDF-AB0D-9C195ECE07E1}" type="datetimeFigureOut">
               <a:rPr lang="en-US" smtClean="0"/>
-              <a:t>7/16/2012</a:t>
+              <a:t>7/22/2012</a:t>
             </a:fld>
             <a:endParaRPr lang="en-US"/>
           </a:p>
@@ -2286,7 +2285,7 @@
           <a:p>
             <a:fld id="{69992F9E-A296-4BDF-AB0D-9C195ECE07E1}" type="datetimeFigureOut">
               <a:rPr lang="en-US" smtClean="0"/>
-              <a:t>7/16/2012</a:t>
+              <a:t>7/22/2012</a:t>
             </a:fld>
             <a:endParaRPr lang="en-US"/>
           </a:p>
@@ -2430,7 +2429,7 @@
           <a:p>
             <a:fld id="{69992F9E-A296-4BDF-AB0D-9C195ECE07E1}" type="datetimeFigureOut">
               <a:rPr lang="en-US" smtClean="0"/>
-              <a:t>7/16/2012</a:t>
+              <a:t>7/22/2012</a:t>
             </a:fld>
             <a:endParaRPr lang="en-US"/>
           </a:p>
@@ -2752,7 +2751,7 @@
           <a:p>
             <a:fld id="{69992F9E-A296-4BDF-AB0D-9C195ECE07E1}" type="datetimeFigureOut">
               <a:rPr lang="en-US" smtClean="0"/>
-              <a:t>7/16/2012</a:t>
+              <a:t>7/22/2012</a:t>
             </a:fld>
             <a:endParaRPr lang="en-US"/>
           </a:p>
@@ -2886,7 +2885,7 @@
           <a:p>
             <a:fld id="{69992F9E-A296-4BDF-AB0D-9C195ECE07E1}" type="datetimeFigureOut">
               <a:rPr lang="en-US" smtClean="0"/>
-              <a:t>7/16/2012</a:t>
+              <a:t>7/22/2012</a:t>
             </a:fld>
             <a:endParaRPr lang="en-US"/>
           </a:p>
@@ -3667,7 +3666,7 @@
           <a:p>
             <a:fld id="{69992F9E-A296-4BDF-AB0D-9C195ECE07E1}" type="datetimeFigureOut">
               <a:rPr lang="en-US" smtClean="0"/>
-              <a:t>7/16/2012</a:t>
+              <a:t>7/22/2012</a:t>
             </a:fld>
             <a:endParaRPr lang="en-US"/>
           </a:p>
@@ -4345,51 +4344,74 @@
         </p:nvSpPr>
         <p:spPr/>
         <p:txBody>
-          <a:bodyPr>
-            <a:normAutofit/>
-          </a:bodyPr>
-          <a:lstStyle/>
-          <a:p>
-            <a:r>
-              <a:rPr lang="en-US" dirty="0" smtClean="0"/>
-              <a:t>Key Feature: Topics</a:t>
-            </a:r>
-            <a:endParaRPr lang="en-US" dirty="0"/>
-          </a:p>
-        </p:txBody>
-      </p:sp>
-      <p:sp>
-        <p:nvSpPr>
-          <p:cNvPr id="3" name="Content Placeholder 2"/>
-          <p:cNvSpPr>
-            <a:spLocks noGrp="1"/>
-          </p:cNvSpPr>
-          <p:nvPr>
-            <p:ph idx="1"/>
-          </p:nvPr>
-        </p:nvSpPr>
-        <p:spPr/>
-        <p:txBody>
           <a:bodyPr/>
           <a:lstStyle/>
           <a:p>
             <a:r>
               <a:rPr lang="en-US" dirty="0" smtClean="0"/>
-              <a:t>There can be multiple topics during a month’s meeting, and the recording need not be stopped.</a:t>
-            </a:r>
-          </a:p>
-          <a:p>
-            <a:r>
-              <a:rPr lang="en-US" dirty="0" smtClean="0"/>
-              <a:t>The person recording can enter a new topic, and a new podcast entry will be created, automatically.</a:t>
-            </a:r>
+              <a:t>Key Feature: Ease of production</a:t>
+            </a:r>
+            <a:endParaRPr lang="en-US" dirty="0"/>
+          </a:p>
+        </p:txBody>
+      </p:sp>
+      <p:sp>
+        <p:nvSpPr>
+          <p:cNvPr id="3" name="Content Placeholder 2"/>
+          <p:cNvSpPr>
+            <a:spLocks noGrp="1"/>
+          </p:cNvSpPr>
+          <p:nvPr>
+            <p:ph idx="1"/>
+          </p:nvPr>
+        </p:nvSpPr>
+        <p:spPr/>
+        <p:txBody>
+          <a:bodyPr/>
+          <a:lstStyle/>
+          <a:p>
+            <a:r>
+              <a:rPr lang="en-US" dirty="0" smtClean="0"/>
+              <a:t>After the audio has been recorded, to</a:t>
+            </a:r>
+            <a:r>
+              <a:rPr lang="en-US" baseline="0" dirty="0" smtClean="0"/>
+              <a:t> update the website with recent content, two</a:t>
+            </a:r>
+            <a:r>
+              <a:rPr lang="en-US" dirty="0" smtClean="0"/>
+              <a:t> </a:t>
+            </a:r>
+            <a:r>
+              <a:rPr lang="en-US" dirty="0" err="1" smtClean="0"/>
+              <a:t>unix</a:t>
+            </a:r>
+            <a:r>
+              <a:rPr lang="en-US" dirty="0" smtClean="0"/>
+              <a:t> commands are used.</a:t>
+            </a:r>
+          </a:p>
+          <a:p>
+            <a:pPr lvl="1"/>
+            <a:r>
+              <a:rPr lang="en-US" dirty="0" smtClean="0"/>
+              <a:t>Audio files, are converted to mp3s.</a:t>
+            </a:r>
+          </a:p>
+          <a:p>
+            <a:pPr lvl="1"/>
+            <a:r>
+              <a:rPr lang="en-US" dirty="0" smtClean="0"/>
+              <a:t>Screen shots, attachments (if any), are automatically uploaded to the website..</a:t>
+            </a:r>
+            <a:endParaRPr lang="en-US" dirty="0"/>
           </a:p>
         </p:txBody>
       </p:sp>
     </p:spTree>
     <p:extLst>
       <p:ext uri="{BB962C8B-B14F-4D97-AF65-F5344CB8AC3E}">
-        <p14:creationId xmlns:p14="http://schemas.microsoft.com/office/powerpoint/2010/main" val="2386718595"/>
+        <p14:creationId xmlns:p14="http://schemas.microsoft.com/office/powerpoint/2010/main" val="815676706"/>
       </p:ext>
     </p:extLst>
   </p:cSld>
@@ -4428,112 +4450,6 @@
         </p:nvSpPr>
         <p:spPr/>
         <p:txBody>
-          <a:bodyPr/>
-          <a:lstStyle/>
-          <a:p>
-            <a:r>
-              <a:rPr lang="en-US" dirty="0" smtClean="0"/>
-              <a:t>Key Feature: Ease of production</a:t>
-            </a:r>
-            <a:endParaRPr lang="en-US" dirty="0"/>
-          </a:p>
-        </p:txBody>
-      </p:sp>
-      <p:sp>
-        <p:nvSpPr>
-          <p:cNvPr id="3" name="Content Placeholder 2"/>
-          <p:cNvSpPr>
-            <a:spLocks noGrp="1"/>
-          </p:cNvSpPr>
-          <p:nvPr>
-            <p:ph idx="1"/>
-          </p:nvPr>
-        </p:nvSpPr>
-        <p:spPr/>
-        <p:txBody>
-          <a:bodyPr/>
-          <a:lstStyle/>
-          <a:p>
-            <a:r>
-              <a:rPr lang="en-US" dirty="0" smtClean="0"/>
-              <a:t>After the audio has been recorded, to</a:t>
-            </a:r>
-            <a:r>
-              <a:rPr lang="en-US" baseline="0" dirty="0" smtClean="0"/>
-              <a:t> update the website with recent content, two</a:t>
-            </a:r>
-            <a:r>
-              <a:rPr lang="en-US" dirty="0" smtClean="0"/>
-              <a:t> </a:t>
-            </a:r>
-            <a:r>
-              <a:rPr lang="en-US" dirty="0" err="1" smtClean="0"/>
-              <a:t>unix</a:t>
-            </a:r>
-            <a:r>
-              <a:rPr lang="en-US" dirty="0" smtClean="0"/>
-              <a:t> commands are used.</a:t>
-            </a:r>
-          </a:p>
-          <a:p>
-            <a:pPr lvl="1"/>
-            <a:r>
-              <a:rPr lang="en-US" dirty="0" smtClean="0"/>
-              <a:t>Audio files, are converted to mp3s.</a:t>
-            </a:r>
-          </a:p>
-          <a:p>
-            <a:pPr lvl="1"/>
-            <a:r>
-              <a:rPr lang="en-US" dirty="0" smtClean="0"/>
-              <a:t>Screen shots, attachments (if any), are automatically uploaded to the website..</a:t>
-            </a:r>
-            <a:endParaRPr lang="en-US" dirty="0"/>
-          </a:p>
-        </p:txBody>
-      </p:sp>
-    </p:spTree>
-    <p:extLst>
-      <p:ext uri="{BB962C8B-B14F-4D97-AF65-F5344CB8AC3E}">
-        <p14:creationId xmlns:p14="http://schemas.microsoft.com/office/powerpoint/2010/main" val="815676706"/>
-      </p:ext>
-    </p:extLst>
-  </p:cSld>
-  <p:clrMapOvr>
-    <a:masterClrMapping/>
-  </p:clrMapOvr>
-</p:sld>
-</file>
-
-<file path=ppt/slides/slide12.xml><?xml version="1.0" encoding="utf-8"?>
-<p:sld xmlns:a="http://schemas.openxmlformats.org/drawingml/2006/main" xmlns:r="http://schemas.openxmlformats.org/officeDocument/2006/relationships" xmlns:p="http://schemas.openxmlformats.org/presentationml/2006/main">
-  <p:cSld>
-    <p:spTree>
-      <p:nvGrpSpPr>
-        <p:cNvPr id="1" name=""/>
-        <p:cNvGrpSpPr/>
-        <p:nvPr/>
-      </p:nvGrpSpPr>
-      <p:grpSpPr>
-        <a:xfrm>
-          <a:off x="0" y="0"/>
-          <a:ext cx="0" cy="0"/>
-          <a:chOff x="0" y="0"/>
-          <a:chExt cx="0" cy="0"/>
-        </a:xfrm>
-      </p:grpSpPr>
-      <p:sp>
-        <p:nvSpPr>
-          <p:cNvPr id="2" name="Title 1"/>
-          <p:cNvSpPr>
-            <a:spLocks noGrp="1"/>
-          </p:cNvSpPr>
-          <p:nvPr>
-            <p:ph type="title"/>
-          </p:nvPr>
-        </p:nvSpPr>
-        <p:spPr/>
-        <p:txBody>
           <a:bodyPr>
             <a:normAutofit fontScale="90000"/>
           </a:bodyPr>
@@ -4633,7 +4549,7 @@
 </p:sld>
 </file>
 
-<file path=ppt/slides/slide13.xml><?xml version="1.0" encoding="utf-8"?>
+<file path=ppt/slides/slide12.xml><?xml version="1.0" encoding="utf-8"?>
 <p:sld xmlns:a="http://schemas.openxmlformats.org/drawingml/2006/main" xmlns:r="http://schemas.openxmlformats.org/officeDocument/2006/relationships" xmlns:p="http://schemas.openxmlformats.org/presentationml/2006/main">
   <p:cSld>
     <p:spTree>
@@ -4821,6 +4737,93 @@
 </p:sld>
 </file>
 
+<file path=ppt/slides/slide13.xml><?xml version="1.0" encoding="utf-8"?>
+<p:sld xmlns:a="http://schemas.openxmlformats.org/drawingml/2006/main" xmlns:r="http://schemas.openxmlformats.org/officeDocument/2006/relationships" xmlns:p="http://schemas.openxmlformats.org/presentationml/2006/main">
+  <p:cSld>
+    <p:spTree>
+      <p:nvGrpSpPr>
+        <p:cNvPr id="1" name=""/>
+        <p:cNvGrpSpPr/>
+        <p:nvPr/>
+      </p:nvGrpSpPr>
+      <p:grpSpPr>
+        <a:xfrm>
+          <a:off x="0" y="0"/>
+          <a:ext cx="0" cy="0"/>
+          <a:chOff x="0" y="0"/>
+          <a:chExt cx="0" cy="0"/>
+        </a:xfrm>
+      </p:grpSpPr>
+      <p:sp>
+        <p:nvSpPr>
+          <p:cNvPr id="2" name="Title 1"/>
+          <p:cNvSpPr>
+            <a:spLocks noGrp="1"/>
+          </p:cNvSpPr>
+          <p:nvPr>
+            <p:ph type="title"/>
+          </p:nvPr>
+        </p:nvSpPr>
+        <p:spPr/>
+        <p:txBody>
+          <a:bodyPr>
+            <a:normAutofit fontScale="90000"/>
+          </a:bodyPr>
+          <a:lstStyle/>
+          <a:p>
+            <a:r>
+              <a:rPr lang="en-US" dirty="0" smtClean="0"/>
+              <a:t>Recommendation: Pre-agree</a:t>
+            </a:r>
+            <a:r>
+              <a:rPr lang="en-US" baseline="0" dirty="0" smtClean="0"/>
+              <a:t> on privacy</a:t>
+            </a:r>
+            <a:endParaRPr lang="en-US" dirty="0"/>
+          </a:p>
+        </p:txBody>
+      </p:sp>
+      <p:sp>
+        <p:nvSpPr>
+          <p:cNvPr id="3" name="Content Placeholder 2"/>
+          <p:cNvSpPr>
+            <a:spLocks noGrp="1"/>
+          </p:cNvSpPr>
+          <p:nvPr>
+            <p:ph idx="1"/>
+          </p:nvPr>
+        </p:nvSpPr>
+        <p:spPr/>
+        <p:txBody>
+          <a:bodyPr/>
+          <a:lstStyle/>
+          <a:p>
+            <a:r>
+              <a:rPr lang="en-US" dirty="0" smtClean="0"/>
+              <a:t>Be sure within your group to agree on privacy agreements.  </a:t>
+            </a:r>
+          </a:p>
+          <a:p>
+            <a:r>
+              <a:rPr lang="en-US" dirty="0" smtClean="0"/>
+              <a:t>The primary thing is making sure that the presenter is comfortable with recording.</a:t>
+            </a:r>
+          </a:p>
+        </p:txBody>
+      </p:sp>
+    </p:spTree>
+    <p:extLst>
+      <p:ext uri="{BB962C8B-B14F-4D97-AF65-F5344CB8AC3E}">
+        <p14:creationId xmlns:p14="http://schemas.microsoft.com/office/powerpoint/2010/main" val="1604413168"/>
+      </p:ext>
+    </p:extLst>
+  </p:cSld>
+  <p:clrMapOvr>
+    <a:masterClrMapping/>
+  </p:clrMapOvr>
+</p:sld>
+</file>
+
 <file path=ppt/slides/slide14.xml><?xml version="1.0" encoding="utf-8"?>
 <p:sld xmlns:a="http://schemas.openxmlformats.org/drawingml/2006/main" xmlns:r="http://schemas.openxmlformats.org/officeDocument/2006/relationships" xmlns:p="http://schemas.openxmlformats.org/presentationml/2006/main">
   <p:cSld>
@@ -4850,55 +4853,123 @@
         </p:nvSpPr>
         <p:spPr/>
         <p:txBody>
+          <a:bodyPr/>
+          <a:lstStyle/>
+          <a:p>
+            <a:r>
+              <a:rPr lang="en-US" dirty="0" smtClean="0"/>
+              <a:t>Linux Libraries Used</a:t>
+            </a:r>
+            <a:endParaRPr lang="en-US" dirty="0"/>
+          </a:p>
+        </p:txBody>
+      </p:sp>
+      <p:sp>
+        <p:nvSpPr>
+          <p:cNvPr id="3" name="Content Placeholder 2"/>
+          <p:cNvSpPr>
+            <a:spLocks noGrp="1"/>
+          </p:cNvSpPr>
+          <p:nvPr>
+            <p:ph idx="1"/>
+          </p:nvPr>
+        </p:nvSpPr>
+        <p:spPr/>
+        <p:txBody>
           <a:bodyPr>
-            <a:normAutofit fontScale="90000"/>
+            <a:normAutofit lnSpcReduction="10000"/>
           </a:bodyPr>
           <a:lstStyle/>
           <a:p>
             <a:r>
-              <a:rPr lang="en-US" dirty="0" smtClean="0"/>
-              <a:t>Recommendation: Pre-agree</a:t>
+              <a:rPr lang="en-US" dirty="0" err="1" smtClean="0"/>
+              <a:t>Mysql</a:t>
+            </a:r>
+            <a:r>
+              <a:rPr lang="en-US" dirty="0" smtClean="0"/>
+              <a:t>-server (database)</a:t>
+            </a:r>
+          </a:p>
+          <a:p>
+            <a:r>
+              <a:rPr lang="en-US" dirty="0" err="1" smtClean="0"/>
+              <a:t>Zbar</a:t>
+            </a:r>
+            <a:r>
+              <a:rPr lang="en-US" dirty="0" smtClean="0"/>
+              <a:t>-tools (barcode</a:t>
             </a:r>
             <a:r>
               <a:rPr lang="en-US" baseline="0" dirty="0" smtClean="0"/>
-              <a:t> on privacy</a:t>
+              <a:t> scanner)</a:t>
+            </a:r>
+          </a:p>
+          <a:p>
+            <a:r>
+              <a:rPr lang="en-US" baseline="0" dirty="0" err="1" smtClean="0"/>
+              <a:t>Rsync</a:t>
+            </a:r>
+            <a:r>
+              <a:rPr lang="en-US" baseline="0" dirty="0" smtClean="0"/>
+              <a:t> </a:t>
+            </a:r>
+          </a:p>
+          <a:p>
+            <a:r>
+              <a:rPr lang="en-US" baseline="0" dirty="0" smtClean="0"/>
+              <a:t>Boa (simple web server)</a:t>
+            </a:r>
+          </a:p>
+          <a:p>
+            <a:r>
+              <a:rPr lang="en-US" baseline="0" dirty="0" err="1" smtClean="0"/>
+              <a:t>Flite</a:t>
+            </a:r>
+            <a:r>
+              <a:rPr lang="en-US" baseline="0" dirty="0" smtClean="0"/>
+              <a:t> (text to speech library)</a:t>
+            </a:r>
+          </a:p>
+          <a:p>
+            <a:r>
+              <a:rPr lang="en-US" baseline="0" dirty="0" smtClean="0"/>
+              <a:t>Lame (wav -&gt; mp3)</a:t>
+            </a:r>
+          </a:p>
+          <a:p>
+            <a:r>
+              <a:rPr lang="en-US" dirty="0" smtClean="0"/>
+              <a:t>Libimlib2-dev</a:t>
             </a:r>
             <a:endParaRPr lang="en-US" dirty="0"/>
           </a:p>
-        </p:txBody>
-      </p:sp>
-      <p:sp>
-        <p:nvSpPr>
-          <p:cNvPr id="3" name="Content Placeholder 2"/>
-          <p:cNvSpPr>
-            <a:spLocks noGrp="1"/>
-          </p:cNvSpPr>
-          <p:nvPr>
-            <p:ph idx="1"/>
-          </p:nvPr>
-        </p:nvSpPr>
-        <p:spPr/>
-        <p:txBody>
-          <a:bodyPr/>
-          <a:lstStyle/>
-          <a:p>
-            <a:r>
-              <a:rPr lang="en-US" dirty="0" smtClean="0"/>
-              <a:t>Be sure within your group to agree on privacy agreements.  </a:t>
-            </a:r>
-          </a:p>
-          <a:p>
-            <a:r>
-              <a:rPr lang="en-US" dirty="0" smtClean="0"/>
-              <a:t>The primary thing is making sure that the presenter is comfortable with recording.</a:t>
-            </a:r>
+          <a:p>
+            <a:r>
+              <a:rPr lang="en-US" dirty="0" smtClean="0"/>
+              <a:t>Libimlib2 (Used by </a:t>
+            </a:r>
+            <a:r>
+              <a:rPr lang="en-US" dirty="0" err="1" smtClean="0"/>
+              <a:t>vnc</a:t>
+            </a:r>
+            <a:r>
+              <a:rPr lang="en-US" dirty="0" smtClean="0"/>
+              <a:t> client)</a:t>
+            </a:r>
+          </a:p>
+          <a:p>
+            <a:r>
+              <a:rPr lang="en-US" dirty="0" smtClean="0"/>
+              <a:t>Sox (audio recording)</a:t>
+            </a:r>
+            <a:endParaRPr lang="en-US" dirty="0"/>
           </a:p>
         </p:txBody>
       </p:sp>
     </p:spTree>
     <p:extLst>
       <p:ext uri="{BB962C8B-B14F-4D97-AF65-F5344CB8AC3E}">
-        <p14:creationId xmlns:p14="http://schemas.microsoft.com/office/powerpoint/2010/main" val="1604413168"/>
+        <p14:creationId xmlns:p14="http://schemas.microsoft.com/office/powerpoint/2010/main" val="1014256802"/>
       </p:ext>
     </p:extLst>
   </p:cSld>
@@ -4937,123 +5008,114 @@
         </p:nvSpPr>
         <p:spPr/>
         <p:txBody>
+          <a:bodyPr>
+            <a:normAutofit/>
+          </a:bodyPr>
+          <a:lstStyle/>
+          <a:p>
+            <a:r>
+              <a:rPr lang="en-US" dirty="0" smtClean="0"/>
+              <a:t>Perl Libraries Used</a:t>
+            </a:r>
+            <a:endParaRPr lang="en-US" dirty="0"/>
+          </a:p>
+        </p:txBody>
+      </p:sp>
+      <p:sp>
+        <p:nvSpPr>
+          <p:cNvPr id="3" name="Content Placeholder 2"/>
+          <p:cNvSpPr>
+            <a:spLocks noGrp="1"/>
+          </p:cNvSpPr>
+          <p:nvPr>
+            <p:ph idx="1"/>
+          </p:nvPr>
+        </p:nvSpPr>
+        <p:spPr/>
+        <p:txBody>
           <a:bodyPr/>
           <a:lstStyle/>
           <a:p>
             <a:r>
               <a:rPr lang="en-US" dirty="0" smtClean="0"/>
-              <a:t>Linux Libraries Used</a:t>
-            </a:r>
-            <a:endParaRPr lang="en-US" dirty="0"/>
-          </a:p>
-        </p:txBody>
-      </p:sp>
-      <p:sp>
-        <p:nvSpPr>
-          <p:cNvPr id="3" name="Content Placeholder 2"/>
-          <p:cNvSpPr>
-            <a:spLocks noGrp="1"/>
-          </p:cNvSpPr>
-          <p:nvPr>
-            <p:ph idx="1"/>
-          </p:nvPr>
-        </p:nvSpPr>
-        <p:spPr/>
-        <p:txBody>
-          <a:bodyPr>
-            <a:normAutofit lnSpcReduction="10000"/>
-          </a:bodyPr>
-          <a:lstStyle/>
-          <a:p>
-            <a:r>
-              <a:rPr lang="en-US" dirty="0" err="1" smtClean="0"/>
-              <a:t>Mysql</a:t>
-            </a:r>
-            <a:r>
-              <a:rPr lang="en-US" dirty="0" smtClean="0"/>
-              <a:t>-server (database)</a:t>
-            </a:r>
-          </a:p>
-          <a:p>
-            <a:r>
-              <a:rPr lang="en-US" dirty="0" err="1" smtClean="0"/>
-              <a:t>Zbar</a:t>
-            </a:r>
-            <a:r>
-              <a:rPr lang="en-US" dirty="0" smtClean="0"/>
-              <a:t>-tools (barcode</a:t>
+              <a:t>Core</a:t>
+            </a:r>
+          </a:p>
+          <a:p>
+            <a:pPr lvl="1"/>
+            <a:r>
+              <a:rPr lang="en-US" dirty="0" smtClean="0"/>
+              <a:t>Strict</a:t>
+            </a:r>
+          </a:p>
+          <a:p>
+            <a:pPr lvl="1"/>
+            <a:r>
+              <a:rPr lang="en-US" dirty="0" smtClean="0"/>
+              <a:t>CGI</a:t>
+            </a:r>
+          </a:p>
+          <a:p>
+            <a:pPr lvl="1"/>
+            <a:r>
+              <a:rPr lang="en-US" dirty="0" smtClean="0"/>
+              <a:t>File::Copy</a:t>
+            </a:r>
+          </a:p>
+          <a:p>
+            <a:pPr lvl="1"/>
+            <a:r>
+              <a:rPr lang="en-US" dirty="0" smtClean="0"/>
+              <a:t>File::Find</a:t>
+            </a:r>
+          </a:p>
+          <a:p>
+            <a:pPr lvl="0"/>
+            <a:r>
+              <a:rPr lang="en-US" dirty="0" smtClean="0"/>
+              <a:t>Non-Core</a:t>
+            </a:r>
+          </a:p>
+          <a:p>
+            <a:pPr lvl="1"/>
+            <a:r>
+              <a:rPr lang="en-US" dirty="0" smtClean="0"/>
+              <a:t>File::Path </a:t>
+            </a:r>
+          </a:p>
+          <a:p>
+            <a:pPr lvl="1"/>
+            <a:r>
+              <a:rPr lang="en-US" dirty="0" smtClean="0"/>
+              <a:t>Image::Dot (used</a:t>
             </a:r>
             <a:r>
               <a:rPr lang="en-US" baseline="0" dirty="0" smtClean="0"/>
-              <a:t> scanner)</a:t>
-            </a:r>
-          </a:p>
-          <a:p>
+              <a:t> for </a:t>
+            </a:r>
             <a:r>
               <a:rPr lang="en-US" baseline="0" dirty="0" err="1" smtClean="0"/>
-              <a:t>Rsync</a:t>
+              <a:t>ajax</a:t>
             </a:r>
             <a:r>
               <a:rPr lang="en-US" baseline="0" dirty="0" smtClean="0"/>
-              <a:t> </a:t>
-            </a:r>
-          </a:p>
-          <a:p>
-            <a:r>
-              <a:rPr lang="en-US" baseline="0" dirty="0" smtClean="0"/>
-              <a:t>Boa (simple web server)</a:t>
-            </a:r>
-          </a:p>
-          <a:p>
-            <a:r>
-              <a:rPr lang="en-US" baseline="0" dirty="0" err="1" smtClean="0"/>
-              <a:t>Flite</a:t>
-            </a:r>
-            <a:r>
-              <a:rPr lang="en-US" baseline="0" dirty="0" smtClean="0"/>
-              <a:t> (text to speech library)</a:t>
-            </a:r>
-          </a:p>
-          <a:p>
-            <a:r>
-              <a:rPr lang="en-US" baseline="0" dirty="0" smtClean="0"/>
-              <a:t>Lame (wav -&gt; mp3)</a:t>
-            </a:r>
-          </a:p>
-          <a:p>
-            <a:r>
-              <a:rPr lang="en-US" dirty="0" smtClean="0"/>
-              <a:t>Libimlib2-dev</a:t>
-            </a:r>
-            <a:endParaRPr lang="en-US" dirty="0"/>
-          </a:p>
-          <a:p>
-            <a:r>
-              <a:rPr lang="en-US" dirty="0" smtClean="0"/>
-              <a:t>Libimlib2 (Used by </a:t>
-            </a:r>
-            <a:r>
-              <a:rPr lang="en-US" dirty="0" err="1" smtClean="0"/>
-              <a:t>vnc</a:t>
-            </a:r>
-            <a:r>
-              <a:rPr lang="en-US" dirty="0" smtClean="0"/>
-              <a:t> client)</a:t>
-            </a:r>
-          </a:p>
-          <a:p>
-            <a:r>
-              <a:rPr lang="en-US" dirty="0" smtClean="0"/>
-              <a:t>Sox (audio recording)</a:t>
-            </a:r>
-            <a:endParaRPr lang="en-US" dirty="0"/>
+              <a:t> like things)</a:t>
+            </a:r>
+            <a:endParaRPr lang="en-US" dirty="0" smtClean="0"/>
+          </a:p>
+          <a:p>
+            <a:pPr lvl="1"/>
+            <a:r>
+              <a:rPr lang="en-US" dirty="0" smtClean="0"/>
+              <a:t>MP3::ID3v1Tag (sets mp3 attributes)</a:t>
+            </a:r>
           </a:p>
         </p:txBody>
       </p:sp>
     </p:spTree>
     <p:extLst>
       <p:ext uri="{BB962C8B-B14F-4D97-AF65-F5344CB8AC3E}">
-        <p14:creationId xmlns:p14="http://schemas.microsoft.com/office/powerpoint/2010/main" val="1014256802"/>
+        <p14:creationId xmlns:p14="http://schemas.microsoft.com/office/powerpoint/2010/main" val="1050503567"/>
       </p:ext>
     </p:extLst>
   </p:cSld>
@@ -5092,114 +5154,88 @@
         </p:nvSpPr>
         <p:spPr/>
         <p:txBody>
-          <a:bodyPr>
-            <a:normAutofit/>
-          </a:bodyPr>
-          <a:lstStyle/>
-          <a:p>
-            <a:r>
-              <a:rPr lang="en-US" dirty="0" smtClean="0"/>
-              <a:t>Perl Libraries Used</a:t>
-            </a:r>
-            <a:endParaRPr lang="en-US" dirty="0"/>
-          </a:p>
-        </p:txBody>
-      </p:sp>
-      <p:sp>
-        <p:nvSpPr>
-          <p:cNvPr id="3" name="Content Placeholder 2"/>
-          <p:cNvSpPr>
-            <a:spLocks noGrp="1"/>
-          </p:cNvSpPr>
-          <p:nvPr>
-            <p:ph idx="1"/>
-          </p:nvPr>
-        </p:nvSpPr>
-        <p:spPr/>
-        <p:txBody>
           <a:bodyPr/>
           <a:lstStyle/>
           <a:p>
             <a:r>
               <a:rPr lang="en-US" dirty="0" smtClean="0"/>
-              <a:t>Core</a:t>
-            </a:r>
-          </a:p>
-          <a:p>
-            <a:pPr lvl="1"/>
-            <a:r>
-              <a:rPr lang="en-US" dirty="0" smtClean="0"/>
-              <a:t>Strict</a:t>
-            </a:r>
-          </a:p>
-          <a:p>
-            <a:pPr lvl="1"/>
-            <a:r>
-              <a:rPr lang="en-US" dirty="0" smtClean="0"/>
-              <a:t>CGI</a:t>
-            </a:r>
-          </a:p>
-          <a:p>
-            <a:pPr lvl="1"/>
-            <a:r>
-              <a:rPr lang="en-US" dirty="0" smtClean="0"/>
-              <a:t>File::Copy</a:t>
-            </a:r>
-          </a:p>
-          <a:p>
-            <a:pPr lvl="1"/>
-            <a:r>
-              <a:rPr lang="en-US" dirty="0" smtClean="0"/>
-              <a:t>File::Find</a:t>
-            </a:r>
-          </a:p>
-          <a:p>
-            <a:pPr lvl="0"/>
-            <a:r>
-              <a:rPr lang="en-US" dirty="0" smtClean="0"/>
-              <a:t>Non-Core</a:t>
-            </a:r>
-          </a:p>
-          <a:p>
-            <a:pPr lvl="1"/>
-            <a:r>
-              <a:rPr lang="en-US" dirty="0" smtClean="0"/>
-              <a:t>File::Path </a:t>
-            </a:r>
-          </a:p>
-          <a:p>
-            <a:pPr lvl="1"/>
-            <a:r>
-              <a:rPr lang="en-US" dirty="0" smtClean="0"/>
-              <a:t>Image::Dot (used</a:t>
+              <a:t>Perl Libraries</a:t>
             </a:r>
             <a:r>
               <a:rPr lang="en-US" baseline="0" dirty="0" smtClean="0"/>
-              <a:t> for </a:t>
+              <a:t> Continued</a:t>
+            </a:r>
+            <a:endParaRPr lang="en-US" dirty="0"/>
+          </a:p>
+        </p:txBody>
+      </p:sp>
+      <p:sp>
+        <p:nvSpPr>
+          <p:cNvPr id="3" name="Content Placeholder 2"/>
+          <p:cNvSpPr>
+            <a:spLocks noGrp="1"/>
+          </p:cNvSpPr>
+          <p:nvPr>
+            <p:ph idx="1"/>
+          </p:nvPr>
+        </p:nvSpPr>
+        <p:spPr/>
+        <p:txBody>
+          <a:bodyPr/>
+          <a:lstStyle/>
+          <a:p>
+            <a:r>
+              <a:rPr lang="en-US" dirty="0" smtClean="0"/>
+              <a:t>Net::Address::IP::Local – determines your local IP Address</a:t>
+            </a:r>
+          </a:p>
+          <a:p>
+            <a:r>
+              <a:rPr lang="en-US" dirty="0" smtClean="0"/>
+              <a:t>Net::VNC</a:t>
+            </a:r>
+            <a:r>
+              <a:rPr lang="en-US" baseline="0" dirty="0" smtClean="0"/>
+              <a:t> – Perl </a:t>
             </a:r>
             <a:r>
               <a:rPr lang="en-US" baseline="0" dirty="0" err="1" smtClean="0"/>
-              <a:t>ajax</a:t>
+              <a:t>vnc</a:t>
             </a:r>
             <a:r>
               <a:rPr lang="en-US" baseline="0" dirty="0" smtClean="0"/>
-              <a:t> like things)</a:t>
-            </a:r>
-            <a:endParaRPr lang="en-US" dirty="0" smtClean="0"/>
-          </a:p>
-          <a:p>
-            <a:pPr lvl="1"/>
-            <a:r>
-              <a:rPr lang="en-US" dirty="0" smtClean="0"/>
-              <a:t>MP3::ID3v1Tag (sets mp3 attributes)</a:t>
-            </a:r>
+              <a:t> client</a:t>
+            </a:r>
+          </a:p>
+          <a:p>
+            <a:r>
+              <a:rPr lang="en-US" baseline="0" dirty="0" err="1" smtClean="0"/>
+              <a:t>Proc</a:t>
+            </a:r>
+            <a:r>
+              <a:rPr lang="en-US" baseline="0" dirty="0" smtClean="0"/>
+              <a:t>::Background – Runs processes in background space</a:t>
+            </a:r>
+          </a:p>
+          <a:p>
+            <a:r>
+              <a:rPr lang="en-US" baseline="0" dirty="0" smtClean="0"/>
+              <a:t>URL::Encode </a:t>
+            </a:r>
+          </a:p>
+          <a:p>
+            <a:r>
+              <a:rPr lang="en-US" baseline="0" dirty="0" smtClean="0"/>
+              <a:t>URI::Escape </a:t>
+            </a:r>
+            <a:endParaRPr lang="en-US" dirty="0"/>
           </a:p>
         </p:txBody>
       </p:sp>
     </p:spTree>
     <p:extLst>
       <p:ext uri="{BB962C8B-B14F-4D97-AF65-F5344CB8AC3E}">
-        <p14:creationId xmlns:p14="http://schemas.microsoft.com/office/powerpoint/2010/main" val="1050503567"/>
+        <p14:creationId xmlns:p14="http://schemas.microsoft.com/office/powerpoint/2010/main" val="975951588"/>
       </p:ext>
     </p:extLst>
   </p:cSld>
@@ -5243,11 +5279,7 @@
           <a:p>
             <a:r>
               <a:rPr lang="en-US" dirty="0" smtClean="0"/>
-              <a:t>Perl Libraries</a:t>
-            </a:r>
-            <a:r>
-              <a:rPr lang="en-US" baseline="0" dirty="0" smtClean="0"/>
-              <a:t> Continued</a:t>
+              <a:t>Installing</a:t>
             </a:r>
             <a:endParaRPr lang="en-US" dirty="0"/>
           </a:p>
@@ -5270,47 +5302,28 @@
           <a:p>
             <a:r>
               <a:rPr lang="en-US" dirty="0" smtClean="0"/>
-              <a:t>Net::Address::IP::Local – determines your local IP Address</a:t>
-            </a:r>
-          </a:p>
-          <a:p>
-            <a:r>
-              <a:rPr lang="en-US" dirty="0" smtClean="0"/>
-              <a:t>Net::VNC</a:t>
-            </a:r>
-            <a:r>
-              <a:rPr lang="en-US" baseline="0" dirty="0" smtClean="0"/>
-              <a:t> – Perl </a:t>
-            </a:r>
-            <a:r>
-              <a:rPr lang="en-US" baseline="0" dirty="0" err="1" smtClean="0"/>
-              <a:t>vnc</a:t>
-            </a:r>
-            <a:r>
-              <a:rPr lang="en-US" baseline="0" dirty="0" smtClean="0"/>
-              <a:t> client</a:t>
-            </a:r>
-          </a:p>
-          <a:p>
-            <a:r>
-              <a:rPr lang="en-US" baseline="0" dirty="0" err="1" smtClean="0"/>
-              <a:t>Proc</a:t>
-            </a:r>
-            <a:r>
-              <a:rPr lang="en-US" baseline="0" dirty="0" smtClean="0"/>
-              <a:t>::Background – Runs processes in background space</a:t>
-            </a:r>
-          </a:p>
-          <a:p>
-            <a:r>
-              <a:rPr lang="en-US" baseline="0" dirty="0" smtClean="0"/>
-              <a:t>URL::Encode </a:t>
-            </a:r>
-          </a:p>
-          <a:p>
-            <a:r>
-              <a:rPr lang="en-US" baseline="0" dirty="0" smtClean="0"/>
-              <a:t>URI::Escape </a:t>
+              <a:t>Download code from </a:t>
+            </a:r>
+            <a:r>
+              <a:rPr lang="en-US" dirty="0" err="1" smtClean="0"/>
+              <a:t>github</a:t>
+            </a:r>
+            <a:endParaRPr lang="en-US" dirty="0" smtClean="0"/>
+          </a:p>
+          <a:p>
+            <a:pPr lvl="1"/>
+            <a:r>
+              <a:rPr lang="en-US" dirty="0">
+                <a:hlinkClick r:id="rId2"/>
+              </a:rPr>
+              <a:t>https://github.com/japharl</a:t>
+            </a:r>
+            <a:endParaRPr lang="en-US" dirty="0"/>
+          </a:p>
+          <a:p>
+            <a:r>
+              <a:rPr lang="en-US" dirty="0" smtClean="0"/>
+              <a:t>Read &amp; Follow INSTALL document.</a:t>
             </a:r>
             <a:endParaRPr lang="en-US" dirty="0"/>
           </a:p>
@@ -5319,7 +5332,7 @@
     </p:spTree>
     <p:extLst>
       <p:ext uri="{BB962C8B-B14F-4D97-AF65-F5344CB8AC3E}">
-        <p14:creationId xmlns:p14="http://schemas.microsoft.com/office/powerpoint/2010/main" val="975951588"/>
+        <p14:creationId xmlns:p14="http://schemas.microsoft.com/office/powerpoint/2010/main" val="2384374982"/>
       </p:ext>
     </p:extLst>
   </p:cSld>
@@ -5363,7 +5376,7 @@
           <a:p>
             <a:r>
               <a:rPr lang="en-US" dirty="0" smtClean="0"/>
-              <a:t>Installing</a:t>
+              <a:t>Future Work</a:t>
             </a:r>
             <a:endParaRPr lang="en-US" dirty="0"/>
           </a:p>
@@ -5386,29 +5399,66 @@
           <a:p>
             <a:r>
               <a:rPr lang="en-US" dirty="0" smtClean="0"/>
-              <a:t>Download code from </a:t>
+              <a:t>Update</a:t>
+            </a:r>
+            <a:r>
+              <a:rPr lang="en-US" baseline="0" dirty="0" smtClean="0"/>
+              <a:t> code to use SQLite instead of MySQL (less dependencies than </a:t>
+            </a:r>
+            <a:r>
+              <a:rPr lang="en-US" baseline="0" dirty="0" err="1" smtClean="0"/>
+              <a:t>mysql</a:t>
+            </a:r>
+            <a:r>
+              <a:rPr lang="en-US" baseline="0" dirty="0" smtClean="0"/>
+              <a:t>)</a:t>
+            </a:r>
+          </a:p>
+          <a:p>
+            <a:r>
+              <a:rPr lang="en-US" baseline="0" dirty="0" smtClean="0"/>
+              <a:t>Plugins</a:t>
+            </a:r>
+            <a:endParaRPr lang="en-US" dirty="0" smtClean="0"/>
+          </a:p>
+          <a:p>
+            <a:pPr lvl="1"/>
+            <a:r>
+              <a:rPr lang="en-US" dirty="0" smtClean="0"/>
+              <a:t>Audio Transcription (via speech recognizer software?)</a:t>
+            </a:r>
+          </a:p>
+          <a:p>
+            <a:pPr lvl="1"/>
+            <a:r>
+              <a:rPr lang="en-US" dirty="0" smtClean="0"/>
+              <a:t>A “mod voice” for when speakers don’t wish to be identified.</a:t>
+            </a:r>
+          </a:p>
+          <a:p>
+            <a:pPr lvl="1"/>
+            <a:r>
+              <a:rPr lang="en-US" dirty="0" smtClean="0"/>
+              <a:t>Capture </a:t>
             </a:r>
             <a:r>
               <a:rPr lang="en-US" dirty="0" err="1" smtClean="0"/>
-              <a:t>github</a:t>
-            </a:r>
-            <a:endParaRPr lang="en-US" dirty="0" smtClean="0"/>
+              <a:t>usb</a:t>
+            </a:r>
+            <a:r>
+              <a:rPr lang="en-US" dirty="0" smtClean="0"/>
+              <a:t> / other camera.</a:t>
+            </a:r>
           </a:p>
           <a:p>
             <a:pPr lvl="1"/>
             <a:r>
-              <a:rPr lang="en-US" dirty="0">
-                <a:hlinkClick r:id="rId2"/>
-              </a:rPr>
-              <a:t>https://github.com/japharl</a:t>
-            </a:r>
-            <a:endParaRPr lang="en-US" dirty="0"/>
-          </a:p>
-          <a:p>
-            <a:r>
-              <a:rPr lang="en-US" dirty="0" smtClean="0"/>
-              <a:t>Read &amp; Follow INSTALL document.</a:t>
-            </a:r>
+              <a:rPr lang="en-US" dirty="0" smtClean="0"/>
+              <a:t>Call in capability</a:t>
+            </a:r>
+          </a:p>
+          <a:p>
+            <a:pPr lvl="1"/>
             <a:endParaRPr lang="en-US" dirty="0"/>
           </a:p>
         </p:txBody>
@@ -5416,7 +5466,7 @@
     </p:spTree>
     <p:extLst>
       <p:ext uri="{BB962C8B-B14F-4D97-AF65-F5344CB8AC3E}">
-        <p14:creationId xmlns:p14="http://schemas.microsoft.com/office/powerpoint/2010/main" val="2384374982"/>
+        <p14:creationId xmlns:p14="http://schemas.microsoft.com/office/powerpoint/2010/main" val="3010521338"/>
       </p:ext>
     </p:extLst>
   </p:cSld>
@@ -5459,10 +5509,10 @@
           <a:lstStyle/>
           <a:p>
             <a:r>
-              <a:rPr lang="en-US" dirty="0" smtClean="0"/>
-              <a:t>Future Work</a:t>
-            </a:r>
-            <a:endParaRPr lang="en-US" dirty="0"/>
+              <a:rPr lang="en-US" smtClean="0"/>
+              <a:t>Demo</a:t>
+            </a:r>
+            <a:endParaRPr lang="en-US"/>
           </a:p>
         </p:txBody>
       </p:sp>
@@ -5481,76 +5531,14 @@
           <a:bodyPr/>
           <a:lstStyle/>
           <a:p>
-            <a:r>
-              <a:rPr lang="en-US" dirty="0" smtClean="0"/>
-              <a:t>Update</a:t>
-            </a:r>
-            <a:r>
-              <a:rPr lang="en-US" baseline="0" dirty="0" smtClean="0"/>
-              <a:t> code to use SQLite instead of MySQL (less dependencies than </a:t>
-            </a:r>
-            <a:r>
-              <a:rPr lang="en-US" baseline="0" dirty="0" err="1" smtClean="0"/>
-              <a:t>mysql</a:t>
-            </a:r>
-            <a:r>
-              <a:rPr lang="en-US" baseline="0" dirty="0" smtClean="0"/>
-              <a:t>)</a:t>
-            </a:r>
-          </a:p>
-          <a:p>
-            <a:r>
-              <a:rPr lang="en-US" baseline="0" dirty="0" smtClean="0"/>
-              <a:t>Plugins</a:t>
-            </a:r>
-            <a:endParaRPr lang="en-US" dirty="0" smtClean="0"/>
-          </a:p>
-          <a:p>
-            <a:pPr lvl="1"/>
-            <a:r>
-              <a:rPr lang="en-US" dirty="0" smtClean="0"/>
-              <a:t>Audio Transcription (via speech recognizer software?)</a:t>
-            </a:r>
-          </a:p>
-          <a:p>
-            <a:pPr lvl="1"/>
-            <a:r>
-              <a:rPr lang="en-US" dirty="0" smtClean="0"/>
-              <a:t>A “mod voice” for when speakers don’t wish to be identified.</a:t>
-            </a:r>
-          </a:p>
-          <a:p>
-            <a:pPr lvl="1"/>
-            <a:r>
-              <a:rPr lang="en-US" dirty="0" smtClean="0"/>
-              <a:t>Capture </a:t>
-            </a:r>
-            <a:r>
-              <a:rPr lang="en-US" dirty="0" err="1" smtClean="0"/>
-              <a:t>usb</a:t>
-            </a:r>
-            <a:r>
-              <a:rPr lang="en-US" dirty="0" smtClean="0"/>
-              <a:t> / other camera.</a:t>
-            </a:r>
-          </a:p>
-          <a:p>
-            <a:pPr lvl="1"/>
-            <a:r>
-              <a:rPr lang="en-US" dirty="0" smtClean="0"/>
-              <a:t>Call in capability</a:t>
-            </a:r>
-          </a:p>
-          <a:p>
-            <a:pPr lvl="1"/>
-            <a:endParaRPr lang="en-US" dirty="0"/>
+            <a:endParaRPr lang="en-US"/>
           </a:p>
         </p:txBody>
       </p:sp>
     </p:spTree>
     <p:extLst>
       <p:ext uri="{BB962C8B-B14F-4D97-AF65-F5344CB8AC3E}">
-        <p14:creationId xmlns:p14="http://schemas.microsoft.com/office/powerpoint/2010/main" val="3010521338"/>
+        <p14:creationId xmlns:p14="http://schemas.microsoft.com/office/powerpoint/2010/main" val="4287035884"/>
       </p:ext>
     </p:extLst>
   </p:cSld>
@@ -5702,78 +5690,6 @@
           <a:lstStyle/>
           <a:p>
             <a:r>
-              <a:rPr lang="en-US" smtClean="0"/>
-              <a:t>Demo</a:t>
-            </a:r>
-            <a:endParaRPr lang="en-US"/>
-          </a:p>
-        </p:txBody>
-      </p:sp>
-      <p:sp>
-        <p:nvSpPr>
-          <p:cNvPr id="3" name="Content Placeholder 2"/>
-          <p:cNvSpPr>
-            <a:spLocks noGrp="1"/>
-          </p:cNvSpPr>
-          <p:nvPr>
-            <p:ph idx="1"/>
-          </p:nvPr>
-        </p:nvSpPr>
-        <p:spPr/>
-        <p:txBody>
-          <a:bodyPr/>
-          <a:lstStyle/>
-          <a:p>
-            <a:endParaRPr lang="en-US"/>
-          </a:p>
-        </p:txBody>
-      </p:sp>
-    </p:spTree>
-    <p:extLst>
-      <p:ext uri="{BB962C8B-B14F-4D97-AF65-F5344CB8AC3E}">
-        <p14:creationId xmlns:p14="http://schemas.microsoft.com/office/powerpoint/2010/main" val="4287035884"/>
-      </p:ext>
-    </p:extLst>
-  </p:cSld>
-  <p:clrMapOvr>
-    <a:masterClrMapping/>
-  </p:clrMapOvr>
-</p:sld>
-</file>
-
-<file path=ppt/slides/slide21.xml><?xml version="1.0" encoding="utf-8"?>
-<p:sld xmlns:a="http://schemas.openxmlformats.org/drawingml/2006/main" xmlns:r="http://schemas.openxmlformats.org/officeDocument/2006/relationships" xmlns:p="http://schemas.openxmlformats.org/presentationml/2006/main">
-  <p:cSld>
-    <p:spTree>
-      <p:nvGrpSpPr>
-        <p:cNvPr id="1" name=""/>
-        <p:cNvGrpSpPr/>
-        <p:nvPr/>
-      </p:nvGrpSpPr>
-      <p:grpSpPr>
-        <a:xfrm>
-          <a:off x="0" y="0"/>
-          <a:ext cx="0" cy="0"/>
-          <a:chOff x="0" y="0"/>
-          <a:chExt cx="0" cy="0"/>
-        </a:xfrm>
-      </p:grpSpPr>
-      <p:sp>
-        <p:nvSpPr>
-          <p:cNvPr id="2" name="Title 1"/>
-          <p:cNvSpPr>
-            <a:spLocks noGrp="1"/>
-          </p:cNvSpPr>
-          <p:nvPr>
-            <p:ph type="title"/>
-          </p:nvPr>
-        </p:nvSpPr>
-        <p:spPr/>
-        <p:txBody>
-          <a:bodyPr/>
-          <a:lstStyle/>
-          <a:p>
-            <a:r>
               <a:rPr lang="en-US" dirty="0" smtClean="0"/>
               <a:t>Questions?</a:t>
             </a:r>
@@ -5813,7 +5729,7 @@
 </p:sld>
 </file>
 
-<file path=ppt/slides/slide22.xml><?xml version="1.0" encoding="utf-8"?>
+<file path=ppt/slides/slide21.xml><?xml version="1.0" encoding="utf-8"?>
 <p:sld xmlns:a="http://schemas.openxmlformats.org/drawingml/2006/main" xmlns:r="http://schemas.openxmlformats.org/officeDocument/2006/relationships" xmlns:p="http://schemas.openxmlformats.org/presentationml/2006/main">
   <p:cSld>
     <p:spTree>

</xml_diff>